<commit_message>
paper submitted june 28
</commit_message>
<xml_diff>
--- a/paper/Figs/PIML_strategies_v2.pptx
+++ b/paper/Figs/PIML_strategies_v2.pptx
@@ -243,7 +243,7 @@
           <a:p>
             <a:fld id="{76F0B9BA-9203-4958-8296-6C2D8DB321A8}" type="datetimeFigureOut">
               <a:rPr lang="en-US" smtClean="0"/>
-              <a:t>6/20/2020</a:t>
+              <a:t>6/21/2020</a:t>
             </a:fld>
             <a:endParaRPr lang="en-US"/>
           </a:p>
@@ -413,7 +413,7 @@
           <a:p>
             <a:fld id="{76F0B9BA-9203-4958-8296-6C2D8DB321A8}" type="datetimeFigureOut">
               <a:rPr lang="en-US" smtClean="0"/>
-              <a:t>6/20/2020</a:t>
+              <a:t>6/21/2020</a:t>
             </a:fld>
             <a:endParaRPr lang="en-US"/>
           </a:p>
@@ -593,7 +593,7 @@
           <a:p>
             <a:fld id="{76F0B9BA-9203-4958-8296-6C2D8DB321A8}" type="datetimeFigureOut">
               <a:rPr lang="en-US" smtClean="0"/>
-              <a:t>6/20/2020</a:t>
+              <a:t>6/21/2020</a:t>
             </a:fld>
             <a:endParaRPr lang="en-US"/>
           </a:p>
@@ -763,7 +763,7 @@
           <a:p>
             <a:fld id="{76F0B9BA-9203-4958-8296-6C2D8DB321A8}" type="datetimeFigureOut">
               <a:rPr lang="en-US" smtClean="0"/>
-              <a:t>6/20/2020</a:t>
+              <a:t>6/21/2020</a:t>
             </a:fld>
             <a:endParaRPr lang="en-US"/>
           </a:p>
@@ -1007,7 +1007,7 @@
           <a:p>
             <a:fld id="{76F0B9BA-9203-4958-8296-6C2D8DB321A8}" type="datetimeFigureOut">
               <a:rPr lang="en-US" smtClean="0"/>
-              <a:t>6/20/2020</a:t>
+              <a:t>6/21/2020</a:t>
             </a:fld>
             <a:endParaRPr lang="en-US"/>
           </a:p>
@@ -1239,7 +1239,7 @@
           <a:p>
             <a:fld id="{76F0B9BA-9203-4958-8296-6C2D8DB321A8}" type="datetimeFigureOut">
               <a:rPr lang="en-US" smtClean="0"/>
-              <a:t>6/20/2020</a:t>
+              <a:t>6/21/2020</a:t>
             </a:fld>
             <a:endParaRPr lang="en-US"/>
           </a:p>
@@ -1606,7 +1606,7 @@
           <a:p>
             <a:fld id="{76F0B9BA-9203-4958-8296-6C2D8DB321A8}" type="datetimeFigureOut">
               <a:rPr lang="en-US" smtClean="0"/>
-              <a:t>6/20/2020</a:t>
+              <a:t>6/21/2020</a:t>
             </a:fld>
             <a:endParaRPr lang="en-US"/>
           </a:p>
@@ -1724,7 +1724,7 @@
           <a:p>
             <a:fld id="{76F0B9BA-9203-4958-8296-6C2D8DB321A8}" type="datetimeFigureOut">
               <a:rPr lang="en-US" smtClean="0"/>
-              <a:t>6/20/2020</a:t>
+              <a:t>6/21/2020</a:t>
             </a:fld>
             <a:endParaRPr lang="en-US"/>
           </a:p>
@@ -1819,7 +1819,7 @@
           <a:p>
             <a:fld id="{76F0B9BA-9203-4958-8296-6C2D8DB321A8}" type="datetimeFigureOut">
               <a:rPr lang="en-US" smtClean="0"/>
-              <a:t>6/20/2020</a:t>
+              <a:t>6/21/2020</a:t>
             </a:fld>
             <a:endParaRPr lang="en-US"/>
           </a:p>
@@ -2096,7 +2096,7 @@
           <a:p>
             <a:fld id="{76F0B9BA-9203-4958-8296-6C2D8DB321A8}" type="datetimeFigureOut">
               <a:rPr lang="en-US" smtClean="0"/>
-              <a:t>6/20/2020</a:t>
+              <a:t>6/21/2020</a:t>
             </a:fld>
             <a:endParaRPr lang="en-US"/>
           </a:p>
@@ -2353,7 +2353,7 @@
           <a:p>
             <a:fld id="{76F0B9BA-9203-4958-8296-6C2D8DB321A8}" type="datetimeFigureOut">
               <a:rPr lang="en-US" smtClean="0"/>
-              <a:t>6/20/2020</a:t>
+              <a:t>6/21/2020</a:t>
             </a:fld>
             <a:endParaRPr lang="en-US"/>
           </a:p>
@@ -2566,7 +2566,7 @@
           <a:p>
             <a:fld id="{76F0B9BA-9203-4958-8296-6C2D8DB321A8}" type="datetimeFigureOut">
               <a:rPr lang="en-US" smtClean="0"/>
-              <a:t>6/20/2020</a:t>
+              <a:t>6/21/2020</a:t>
             </a:fld>
             <a:endParaRPr lang="en-US"/>
           </a:p>
@@ -2971,8 +2971,8 @@
           <a:chExt cx="0" cy="0"/>
         </a:xfrm>
       </p:grpSpPr>
-      <mc:AlternateContent xmlns:mc="http://schemas.openxmlformats.org/markup-compatibility/2006">
-        <mc:Choice xmlns:a14="http://schemas.microsoft.com/office/drawing/2010/main" Requires="a14">
+      <mc:AlternateContent xmlns:mc="http://schemas.openxmlformats.org/markup-compatibility/2006" xmlns:a14="http://schemas.microsoft.com/office/drawing/2010/main">
+        <mc:Choice Requires="a14">
           <p:sp>
             <p:nvSpPr>
               <p:cNvPr id="41" name="Rectangle: Single Corner Snipped 40" descr="sd">
@@ -3061,7 +3061,7 @@
             </p:txBody>
           </p:sp>
         </mc:Choice>
-        <mc:Fallback>
+        <mc:Fallback xmlns="">
           <p:sp>
             <p:nvSpPr>
               <p:cNvPr id="41" name="Rectangle: Single Corner Snipped 40" descr="sd">
@@ -3149,8 +3149,8 @@
           </a:fontRef>
         </p:style>
       </p:cxnSp>
-      <mc:AlternateContent xmlns:mc="http://schemas.openxmlformats.org/markup-compatibility/2006">
-        <mc:Choice xmlns:a14="http://schemas.microsoft.com/office/drawing/2010/main" Requires="a14">
+      <mc:AlternateContent xmlns:mc="http://schemas.openxmlformats.org/markup-compatibility/2006" xmlns:a14="http://schemas.microsoft.com/office/drawing/2010/main">
+        <mc:Choice Requires="a14">
           <p:sp>
             <p:nvSpPr>
               <p:cNvPr id="47" name="TextBox 46">
@@ -3200,7 +3200,7 @@
             </p:txBody>
           </p:sp>
         </mc:Choice>
-        <mc:Fallback>
+        <mc:Fallback xmlns="">
           <p:sp>
             <p:nvSpPr>
               <p:cNvPr id="47" name="TextBox 46">
@@ -3245,8 +3245,8 @@
           </p:sp>
         </mc:Fallback>
       </mc:AlternateContent>
-      <mc:AlternateContent xmlns:mc="http://schemas.openxmlformats.org/markup-compatibility/2006">
-        <mc:Choice xmlns:a14="http://schemas.microsoft.com/office/drawing/2010/main" Requires="a14">
+      <mc:AlternateContent xmlns:mc="http://schemas.openxmlformats.org/markup-compatibility/2006" xmlns:a14="http://schemas.microsoft.com/office/drawing/2010/main">
+        <mc:Choice Requires="a14">
           <p:sp>
             <p:nvSpPr>
               <p:cNvPr id="50" name="Rectangle 49" descr="sd">
@@ -3316,7 +3316,7 @@
             </p:txBody>
           </p:sp>
         </mc:Choice>
-        <mc:Fallback>
+        <mc:Fallback xmlns="">
           <p:sp>
             <p:nvSpPr>
               <p:cNvPr id="50" name="Rectangle 49" descr="sd">
@@ -3361,8 +3361,8 @@
           </p:sp>
         </mc:Fallback>
       </mc:AlternateContent>
-      <mc:AlternateContent xmlns:mc="http://schemas.openxmlformats.org/markup-compatibility/2006">
-        <mc:Choice xmlns:a14="http://schemas.microsoft.com/office/drawing/2010/main" Requires="a14">
+      <mc:AlternateContent xmlns:mc="http://schemas.openxmlformats.org/markup-compatibility/2006" xmlns:a14="http://schemas.microsoft.com/office/drawing/2010/main">
+        <mc:Choice Requires="a14">
           <p:sp>
             <p:nvSpPr>
               <p:cNvPr id="52" name="TextBox 51">
@@ -3424,7 +3424,7 @@
             </p:txBody>
           </p:sp>
         </mc:Choice>
-        <mc:Fallback>
+        <mc:Fallback xmlns="">
           <p:sp>
             <p:nvSpPr>
               <p:cNvPr id="52" name="TextBox 51">
@@ -3671,8 +3671,8 @@
           </a:p>
         </p:txBody>
       </p:sp>
-      <mc:AlternateContent xmlns:mc="http://schemas.openxmlformats.org/markup-compatibility/2006">
-        <mc:Choice xmlns:a14="http://schemas.microsoft.com/office/drawing/2010/main" Requires="a14">
+      <mc:AlternateContent xmlns:mc="http://schemas.openxmlformats.org/markup-compatibility/2006" xmlns:a14="http://schemas.microsoft.com/office/drawing/2010/main">
+        <mc:Choice Requires="a14">
           <p:sp>
             <p:nvSpPr>
               <p:cNvPr id="72" name="Rectangle 71" descr="sd">
@@ -3764,7 +3764,7 @@
             </p:txBody>
           </p:sp>
         </mc:Choice>
-        <mc:Fallback>
+        <mc:Fallback xmlns="">
           <p:sp>
             <p:nvSpPr>
               <p:cNvPr id="72" name="Rectangle 71" descr="sd">
@@ -3932,8 +3932,8 @@
           </a:p>
         </p:txBody>
       </p:sp>
-      <mc:AlternateContent xmlns:mc="http://schemas.openxmlformats.org/markup-compatibility/2006">
-        <mc:Choice xmlns:a14="http://schemas.microsoft.com/office/drawing/2010/main" Requires="a14">
+      <mc:AlternateContent xmlns:mc="http://schemas.openxmlformats.org/markup-compatibility/2006" xmlns:a14="http://schemas.microsoft.com/office/drawing/2010/main">
+        <mc:Choice Requires="a14">
           <p:sp>
             <p:nvSpPr>
               <p:cNvPr id="21" name="TextBox 20">
@@ -3949,7 +3949,7 @@
             <p:spPr>
               <a:xfrm>
                 <a:off x="2868226" y="891419"/>
-                <a:ext cx="1168094" cy="349583"/>
+                <a:ext cx="1168094" cy="361189"/>
               </a:xfrm>
               <a:prstGeom prst="rect">
                 <a:avLst/>
@@ -3962,73 +3962,78 @@
               </a:bodyPr>
               <a:lstStyle/>
               <a:p>
-                <a:pPr/>
                 <a14:m>
                   <m:oMath xmlns:m="http://schemas.openxmlformats.org/officeDocument/2006/math">
-                    <m:sSup>
-                      <m:sSupPr>
+                    <m:sSub>
+                      <m:sSubPr>
                         <m:ctrlPr>
-                          <a:rPr lang="en-US" sz="1600" i="1" dirty="0">
+                          <a:rPr lang="en-US" sz="1600" i="1" smtClean="0">
                             <a:latin typeface="Cambria Math" panose="02040503050406030204" pitchFamily="18" charset="0"/>
                           </a:rPr>
                         </m:ctrlPr>
-                      </m:sSupPr>
+                      </m:sSubPr>
                       <m:e>
                         <m:r>
-                          <a:rPr lang="en-US" sz="1600" b="1" i="1" dirty="0">
+                          <a:rPr lang="en-US" sz="1600" b="1" i="1" smtClean="0">
                             <a:latin typeface="Cambria Math" panose="02040503050406030204" pitchFamily="18" charset="0"/>
                           </a:rPr>
                           <m:t>𝑿</m:t>
                         </m:r>
                       </m:e>
-                      <m:sup>
+                      <m:sub>
                         <m:r>
                           <m:rPr>
                             <m:sty m:val="p"/>
                           </m:rPr>
-                          <a:rPr lang="en-US" sz="1600" dirty="0">
+                          <a:rPr lang="en-US" sz="1600" b="0" i="0" smtClean="0">
                             <a:latin typeface="Cambria Math" panose="02040503050406030204" pitchFamily="18" charset="0"/>
                           </a:rPr>
                           <m:t>phy</m:t>
                         </m:r>
-                      </m:sup>
-                    </m:sSup>
+                      </m:sub>
+                    </m:sSub>
                   </m:oMath>
                 </a14:m>
                 <a:r>
                   <a:rPr lang="en-US" sz="1600" dirty="0"/>
-                  <a:t>, </a:t>
+                  <a:t>,</a:t>
                 </a:r>
                 <a14:m>
                   <m:oMath xmlns:m="http://schemas.openxmlformats.org/officeDocument/2006/math">
-                    <m:sSup>
-                      <m:sSupPr>
+                    <m:sSub>
+                      <m:sSubPr>
                         <m:ctrlPr>
-                          <a:rPr lang="en-US" sz="1600" i="1" dirty="0">
+                          <a:rPr lang="en-US" sz="1600" i="1">
                             <a:latin typeface="Cambria Math" panose="02040503050406030204" pitchFamily="18" charset="0"/>
                           </a:rPr>
                         </m:ctrlPr>
-                      </m:sSupPr>
+                      </m:sSubPr>
                       <m:e>
                         <m:r>
-                          <a:rPr lang="en-US" sz="1600" b="1" i="1" dirty="0">
+                          <a:rPr lang="en-US" sz="1600" b="1" i="1" smtClean="0">
+                            <a:latin typeface="Cambria Math" panose="02040503050406030204" pitchFamily="18" charset="0"/>
+                          </a:rPr>
+                          <m:t> </m:t>
+                        </m:r>
+                        <m:r>
+                          <a:rPr lang="en-US" sz="1600" b="1" i="1" smtClean="0">
                             <a:latin typeface="Cambria Math" panose="02040503050406030204" pitchFamily="18" charset="0"/>
                           </a:rPr>
                           <m:t>𝒀</m:t>
                         </m:r>
                       </m:e>
-                      <m:sup>
+                      <m:sub>
                         <m:r>
                           <m:rPr>
                             <m:sty m:val="p"/>
                           </m:rPr>
-                          <a:rPr lang="en-US" sz="1600" dirty="0">
+                          <a:rPr lang="en-US" sz="1600">
                             <a:latin typeface="Cambria Math" panose="02040503050406030204" pitchFamily="18" charset="0"/>
                           </a:rPr>
                           <m:t>phy</m:t>
                         </m:r>
-                      </m:sup>
-                    </m:sSup>
+                      </m:sub>
+                    </m:sSub>
                   </m:oMath>
                 </a14:m>
                 <a:endParaRPr lang="en-US" sz="1600" dirty="0"/>
@@ -4036,7 +4041,7 @@
             </p:txBody>
           </p:sp>
         </mc:Choice>
-        <mc:Fallback>
+        <mc:Fallback xmlns="">
           <p:sp>
             <p:nvSpPr>
               <p:cNvPr id="21" name="TextBox 20">
@@ -4054,7 +4059,7 @@
             <p:spPr>
               <a:xfrm>
                 <a:off x="2868226" y="891419"/>
-                <a:ext cx="1168094" cy="349583"/>
+                <a:ext cx="1168094" cy="361189"/>
               </a:xfrm>
               <a:prstGeom prst="rect">
                 <a:avLst/>
@@ -4062,7 +4067,7 @@
               <a:blipFill>
                 <a:blip r:embed="rId7"/>
                 <a:stretch>
-                  <a:fillRect t="-1724" b="-20690"/>
+                  <a:fillRect t="-3390" b="-16949"/>
                 </a:stretch>
               </a:blipFill>
             </p:spPr>
@@ -4081,8 +4086,8 @@
           </p:sp>
         </mc:Fallback>
       </mc:AlternateContent>
-      <mc:AlternateContent xmlns:mc="http://schemas.openxmlformats.org/markup-compatibility/2006">
-        <mc:Choice xmlns:a14="http://schemas.microsoft.com/office/drawing/2010/main" Requires="a14">
+      <mc:AlternateContent xmlns:mc="http://schemas.openxmlformats.org/markup-compatibility/2006" xmlns:a14="http://schemas.microsoft.com/office/drawing/2010/main">
+        <mc:Choice Requires="a14">
           <p:sp>
             <p:nvSpPr>
               <p:cNvPr id="26" name="Rectangle 25" descr="sd">
@@ -4097,7 +4102,7 @@
             </p:nvSpPr>
             <p:spPr>
               <a:xfrm>
-                <a:off x="4215457" y="1751661"/>
+                <a:off x="4546774" y="1751661"/>
                 <a:ext cx="632739" cy="365760"/>
               </a:xfrm>
               <a:prstGeom prst="rect">
@@ -4174,7 +4179,7 @@
             </p:txBody>
           </p:sp>
         </mc:Choice>
-        <mc:Fallback>
+        <mc:Fallback xmlns="">
           <p:sp>
             <p:nvSpPr>
               <p:cNvPr id="26" name="Rectangle 25" descr="sd">
@@ -4191,7 +4196,7 @@
             </p:nvSpPr>
             <p:spPr>
               <a:xfrm>
-                <a:off x="4215457" y="1751661"/>
+                <a:off x="4546774" y="1751661"/>
                 <a:ext cx="632739" cy="365760"/>
               </a:xfrm>
               <a:prstGeom prst="rect">
@@ -4200,7 +4205,7 @@
               <a:blipFill>
                 <a:blip r:embed="rId8"/>
                 <a:stretch>
-                  <a:fillRect l="-8571"/>
+                  <a:fillRect l="-8491"/>
                 </a:stretch>
               </a:blipFill>
             </p:spPr>
@@ -4235,8 +4240,8 @@
         </p:nvCxnSpPr>
         <p:spPr>
           <a:xfrm>
-            <a:off x="3691997" y="1898773"/>
-            <a:ext cx="388311" cy="0"/>
+            <a:off x="3961145" y="1914757"/>
+            <a:ext cx="496340" cy="0"/>
           </a:xfrm>
           <a:prstGeom prst="straightConnector1">
             <a:avLst/>
@@ -4280,8 +4285,8 @@
         </p:nvSpPr>
         <p:spPr>
           <a:xfrm>
-            <a:off x="1165478" y="1872416"/>
-            <a:ext cx="1382879" cy="276999"/>
+            <a:off x="1209930" y="1867352"/>
+            <a:ext cx="1281284" cy="276999"/>
           </a:xfrm>
           <a:prstGeom prst="rect">
             <a:avLst/>
@@ -4299,7 +4304,7 @@
                 <a:latin typeface="Times New Roman" panose="02020603050405020304" pitchFamily="18" charset="0"/>
                 <a:cs typeface="Times New Roman" panose="02020603050405020304" pitchFamily="18" charset="0"/>
               </a:rPr>
-              <a:t>Physics constraints</a:t>
+              <a:t>Extra loss terms</a:t>
             </a:r>
           </a:p>
         </p:txBody>
@@ -4322,8 +4327,8 @@
         </p:nvCxnSpPr>
         <p:spPr>
           <a:xfrm flipH="1">
-            <a:off x="4531827" y="1259858"/>
-            <a:ext cx="348723" cy="491803"/>
+            <a:off x="4863144" y="1259858"/>
+            <a:ext cx="17406" cy="491803"/>
           </a:xfrm>
           <a:prstGeom prst="straightConnector1">
             <a:avLst/>
@@ -4499,8 +4504,8 @@
           </a:p>
         </p:txBody>
       </p:sp>
-      <mc:AlternateContent xmlns:mc="http://schemas.openxmlformats.org/markup-compatibility/2006">
-        <mc:Choice xmlns:a14="http://schemas.microsoft.com/office/drawing/2010/main" Requires="a14">
+      <mc:AlternateContent xmlns:mc="http://schemas.openxmlformats.org/markup-compatibility/2006" xmlns:a14="http://schemas.microsoft.com/office/drawing/2010/main">
+        <mc:Choice Requires="a14">
           <p:sp>
             <p:nvSpPr>
               <p:cNvPr id="31" name="TextBox 30">
@@ -4515,7 +4520,7 @@
             </p:nvSpPr>
             <p:spPr>
               <a:xfrm>
-                <a:off x="387130" y="1022818"/>
+                <a:off x="164484" y="1041529"/>
                 <a:ext cx="692449" cy="338554"/>
               </a:xfrm>
               <a:prstGeom prst="rect">
@@ -4536,12 +4541,34 @@
                       <m:jc m:val="centerGroup"/>
                     </m:oMathParaPr>
                     <m:oMath xmlns:m="http://schemas.openxmlformats.org/officeDocument/2006/math">
-                      <m:r>
-                        <a:rPr lang="en-US" sz="1600" b="1" i="1" dirty="0" smtClean="0">
-                          <a:latin typeface="Cambria Math" panose="02040503050406030204" pitchFamily="18" charset="0"/>
-                        </a:rPr>
-                        <m:t>𝑿</m:t>
-                      </m:r>
+                      <m:sSub>
+                        <m:sSubPr>
+                          <m:ctrlPr>
+                            <a:rPr lang="en-US" sz="1600" i="1" smtClean="0">
+                              <a:latin typeface="Cambria Math" panose="02040503050406030204" pitchFamily="18" charset="0"/>
+                            </a:rPr>
+                          </m:ctrlPr>
+                        </m:sSubPr>
+                        <m:e>
+                          <m:r>
+                            <a:rPr lang="en-US" sz="1600" b="1" i="1" smtClean="0">
+                              <a:latin typeface="Cambria Math" panose="02040503050406030204" pitchFamily="18" charset="0"/>
+                            </a:rPr>
+                            <m:t>𝑿</m:t>
+                          </m:r>
+                        </m:e>
+                        <m:sub>
+                          <m:r>
+                            <m:rPr>
+                              <m:sty m:val="p"/>
+                            </m:rPr>
+                            <a:rPr lang="en-US" sz="1600">
+                              <a:latin typeface="Cambria Math" panose="02040503050406030204" pitchFamily="18" charset="0"/>
+                            </a:rPr>
+                            <m:t>obs</m:t>
+                          </m:r>
+                        </m:sub>
+                      </m:sSub>
                       <m:r>
                         <a:rPr lang="en-US" sz="1600" b="1" i="1" dirty="0" smtClean="0">
                           <a:latin typeface="Cambria Math" panose="02040503050406030204" pitchFamily="18" charset="0"/>
@@ -4584,7 +4611,7 @@
             </p:txBody>
           </p:sp>
         </mc:Choice>
-        <mc:Fallback>
+        <mc:Fallback xmlns="">
           <p:sp>
             <p:nvSpPr>
               <p:cNvPr id="31" name="TextBox 30">
@@ -4601,7 +4628,7 @@
             </p:nvSpPr>
             <p:spPr>
               <a:xfrm>
-                <a:off x="387130" y="1022818"/>
+                <a:off x="164484" y="1041529"/>
                 <a:ext cx="692449" cy="338554"/>
               </a:xfrm>
               <a:prstGeom prst="rect">
@@ -4610,7 +4637,7 @@
               <a:blipFill>
                 <a:blip r:embed="rId9"/>
                 <a:stretch>
-                  <a:fillRect r="-7965"/>
+                  <a:fillRect r="-44737"/>
                 </a:stretch>
               </a:blipFill>
             </p:spPr>
@@ -4629,8 +4656,8 @@
           </p:sp>
         </mc:Fallback>
       </mc:AlternateContent>
-      <mc:AlternateContent xmlns:mc="http://schemas.openxmlformats.org/markup-compatibility/2006">
-        <mc:Choice xmlns:a14="http://schemas.microsoft.com/office/drawing/2010/main" Requires="a14">
+      <mc:AlternateContent xmlns:mc="http://schemas.openxmlformats.org/markup-compatibility/2006" xmlns:a14="http://schemas.microsoft.com/office/drawing/2010/main">
+        <mc:Choice Requires="a14">
           <p:sp>
             <p:nvSpPr>
               <p:cNvPr id="32" name="Rectangle 31" descr="sd">
@@ -4700,7 +4727,7 @@
             </p:txBody>
           </p:sp>
         </mc:Choice>
-        <mc:Fallback>
+        <mc:Fallback xmlns="">
           <p:sp>
             <p:nvSpPr>
               <p:cNvPr id="32" name="Rectangle 31" descr="sd">
@@ -4846,8 +4873,8 @@
           </a:p>
         </p:txBody>
       </p:sp>
-      <mc:AlternateContent xmlns:mc="http://schemas.openxmlformats.org/markup-compatibility/2006">
-        <mc:Choice xmlns:a14="http://schemas.microsoft.com/office/drawing/2010/main" Requires="a14">
+      <mc:AlternateContent xmlns:mc="http://schemas.openxmlformats.org/markup-compatibility/2006" xmlns:a14="http://schemas.microsoft.com/office/drawing/2010/main">
+        <mc:Choice Requires="a14">
           <p:sp>
             <p:nvSpPr>
               <p:cNvPr id="55" name="TextBox 54">
@@ -4897,7 +4924,7 @@
             </p:txBody>
           </p:sp>
         </mc:Choice>
-        <mc:Fallback>
+        <mc:Fallback xmlns="">
           <p:sp>
             <p:nvSpPr>
               <p:cNvPr id="55" name="TextBox 54">
@@ -4942,8 +4969,8 @@
           </p:sp>
         </mc:Fallback>
       </mc:AlternateContent>
-      <mc:AlternateContent xmlns:mc="http://schemas.openxmlformats.org/markup-compatibility/2006">
-        <mc:Choice xmlns:a14="http://schemas.microsoft.com/office/drawing/2010/main" Requires="a14">
+      <mc:AlternateContent xmlns:mc="http://schemas.openxmlformats.org/markup-compatibility/2006" xmlns:a14="http://schemas.microsoft.com/office/drawing/2010/main">
+        <mc:Choice Requires="a14">
           <p:sp>
             <p:nvSpPr>
               <p:cNvPr id="56" name="Rectangle 55" descr="sd">
@@ -5035,7 +5062,7 @@
             </p:txBody>
           </p:sp>
         </mc:Choice>
-        <mc:Fallback>
+        <mc:Fallback xmlns="">
           <p:sp>
             <p:nvSpPr>
               <p:cNvPr id="56" name="Rectangle 55" descr="sd">
@@ -5080,8 +5107,8 @@
           </p:sp>
         </mc:Fallback>
       </mc:AlternateContent>
-      <mc:AlternateContent xmlns:mc="http://schemas.openxmlformats.org/markup-compatibility/2006">
-        <mc:Choice xmlns:a14="http://schemas.microsoft.com/office/drawing/2010/main" Requires="a14">
+      <mc:AlternateContent xmlns:mc="http://schemas.openxmlformats.org/markup-compatibility/2006" xmlns:a14="http://schemas.microsoft.com/office/drawing/2010/main">
+        <mc:Choice Requires="a14">
           <p:sp>
             <p:nvSpPr>
               <p:cNvPr id="57" name="TextBox 56">
@@ -5143,7 +5170,7 @@
             </p:txBody>
           </p:sp>
         </mc:Choice>
-        <mc:Fallback>
+        <mc:Fallback xmlns="">
           <p:sp>
             <p:nvSpPr>
               <p:cNvPr id="57" name="TextBox 56">
@@ -5282,8 +5309,8 @@
           </a:fontRef>
         </p:style>
       </p:cxnSp>
-      <mc:AlternateContent xmlns:mc="http://schemas.openxmlformats.org/markup-compatibility/2006">
-        <mc:Choice xmlns:a14="http://schemas.microsoft.com/office/drawing/2010/main" Requires="a14">
+      <mc:AlternateContent xmlns:mc="http://schemas.openxmlformats.org/markup-compatibility/2006" xmlns:a14="http://schemas.microsoft.com/office/drawing/2010/main">
+        <mc:Choice Requires="a14">
           <p:sp>
             <p:nvSpPr>
               <p:cNvPr id="63" name="TextBox 62">
@@ -5319,12 +5346,34 @@
                       <m:jc m:val="centerGroup"/>
                     </m:oMathParaPr>
                     <m:oMath xmlns:m="http://schemas.openxmlformats.org/officeDocument/2006/math">
-                      <m:r>
-                        <a:rPr lang="en-US" sz="1600" b="1" i="1" dirty="0" smtClean="0">
-                          <a:latin typeface="Cambria Math" panose="02040503050406030204" pitchFamily="18" charset="0"/>
-                        </a:rPr>
-                        <m:t>𝑿</m:t>
-                      </m:r>
+                      <m:sSub>
+                        <m:sSubPr>
+                          <m:ctrlPr>
+                            <a:rPr lang="en-US" sz="1600" i="1" smtClean="0">
+                              <a:latin typeface="Cambria Math" panose="02040503050406030204" pitchFamily="18" charset="0"/>
+                            </a:rPr>
+                          </m:ctrlPr>
+                        </m:sSubPr>
+                        <m:e>
+                          <m:r>
+                            <a:rPr lang="en-US" sz="1600" b="1" i="1" smtClean="0">
+                              <a:latin typeface="Cambria Math" panose="02040503050406030204" pitchFamily="18" charset="0"/>
+                            </a:rPr>
+                            <m:t>𝑿</m:t>
+                          </m:r>
+                        </m:e>
+                        <m:sub>
+                          <m:r>
+                            <m:rPr>
+                              <m:sty m:val="p"/>
+                            </m:rPr>
+                            <a:rPr lang="en-US" sz="1600">
+                              <a:latin typeface="Cambria Math" panose="02040503050406030204" pitchFamily="18" charset="0"/>
+                            </a:rPr>
+                            <m:t>obs</m:t>
+                          </m:r>
+                        </m:sub>
+                      </m:sSub>
                       <m:r>
                         <a:rPr lang="en-US" sz="1600" b="1" i="1" dirty="0" smtClean="0">
                           <a:latin typeface="Cambria Math" panose="02040503050406030204" pitchFamily="18" charset="0"/>
@@ -5367,7 +5416,7 @@
             </p:txBody>
           </p:sp>
         </mc:Choice>
-        <mc:Fallback>
+        <mc:Fallback xmlns="">
           <p:sp>
             <p:nvSpPr>
               <p:cNvPr id="63" name="TextBox 62">
@@ -5393,7 +5442,7 @@
               <a:blipFill>
                 <a:blip r:embed="rId14"/>
                 <a:stretch>
-                  <a:fillRect r="-7018"/>
+                  <a:fillRect r="-44737"/>
                 </a:stretch>
               </a:blipFill>
             </p:spPr>

</xml_diff>